<commit_message>
Added Bullet Point on Slide Two
</commit_message>
<xml_diff>
--- a/Project 1 - Group 6 - Data Set Analysis - 03.21.2020.pptx
+++ b/Project 1 - Group 6 - Data Set Analysis - 03.21.2020.pptx
@@ -4326,6 +4326,17 @@
             </a:r>
           </a:p>
           <a:p>
+            <a:r>
+              <a:rPr lang="en-US" dirty="0"/>
+              <a:t>Any </a:t>
+            </a:r>
+            <a:r>
+              <a:rPr lang="en-US"/>
+              <a:t>further questions</a:t>
+            </a:r>
+            <a:endParaRPr lang="en-US" dirty="0"/>
+          </a:p>
+          <a:p>
             <a:endParaRPr lang="en-US" dirty="0"/>
           </a:p>
           <a:p>

</xml_diff>

<commit_message>
Adding Additional Files and changes to Jupyter Notebook
</commit_message>
<xml_diff>
--- a/Project 1 - Group 6 - Data Set Analysis - 03.21.2020.pptx
+++ b/Project 1 - Group 6 - Data Set Analysis - 03.21.2020.pptx
@@ -351,7 +351,7 @@
           <a:p>
             <a:fld id="{ED291B17-9318-49DB-B28B-6E5994AE9581}" type="datetime1">
               <a:rPr lang="en-US" smtClean="0"/>
-              <a:t>3/14/2020</a:t>
+              <a:t>3/16/2020</a:t>
             </a:fld>
             <a:endParaRPr lang="en-US" dirty="0"/>
           </a:p>
@@ -554,7 +554,7 @@
           <a:p>
             <a:fld id="{2CED4963-E985-44C4-B8C4-FDD613B7C2F8}" type="datetime1">
               <a:rPr lang="en-US" smtClean="0"/>
-              <a:t>3/14/2020</a:t>
+              <a:t>3/16/2020</a:t>
             </a:fld>
             <a:endParaRPr lang="en-US" dirty="0"/>
           </a:p>
@@ -916,7 +916,7 @@
           <a:p>
             <a:fld id="{ED291B17-9318-49DB-B28B-6E5994AE9581}" type="datetime1">
               <a:rPr lang="en-US" smtClean="0"/>
-              <a:t>3/14/2020</a:t>
+              <a:t>3/16/2020</a:t>
             </a:fld>
             <a:endParaRPr lang="en-US" dirty="0"/>
           </a:p>
@@ -1114,7 +1114,7 @@
           <a:p>
             <a:fld id="{78DD82B9-B8EE-4375-B6FF-88FA6ABB15D9}" type="datetime1">
               <a:rPr lang="en-US" smtClean="0"/>
-              <a:t>3/14/2020</a:t>
+              <a:t>3/16/2020</a:t>
             </a:fld>
             <a:endParaRPr lang="en-US" dirty="0"/>
           </a:p>
@@ -1426,7 +1426,7 @@
           <a:p>
             <a:fld id="{B2497495-0637-405E-AE64-5CC7506D51F5}" type="datetime1">
               <a:rPr lang="en-US" smtClean="0"/>
-              <a:t>3/14/2020</a:t>
+              <a:t>3/16/2020</a:t>
             </a:fld>
             <a:endParaRPr lang="en-US" dirty="0"/>
           </a:p>
@@ -1679,7 +1679,7 @@
           <a:p>
             <a:fld id="{7BFFD690-9426-415D-8B65-26881E07B2D4}" type="datetime1">
               <a:rPr lang="en-US" smtClean="0"/>
-              <a:t>3/14/2020</a:t>
+              <a:t>3/16/2020</a:t>
             </a:fld>
             <a:endParaRPr lang="en-US" dirty="0"/>
           </a:p>
@@ -2101,7 +2101,7 @@
           <a:p>
             <a:fld id="{04C4989A-474C-40DE-95B9-011C28B71673}" type="datetime1">
               <a:rPr lang="en-US" smtClean="0"/>
-              <a:t>3/14/2020</a:t>
+              <a:t>3/16/2020</a:t>
             </a:fld>
             <a:endParaRPr lang="en-US" dirty="0"/>
           </a:p>
@@ -2224,7 +2224,7 @@
           <a:p>
             <a:fld id="{5DB4ED54-5B5E-4A04-93D3-5772E3CE3818}" type="datetime1">
               <a:rPr lang="en-US" smtClean="0"/>
-              <a:t>3/14/2020</a:t>
+              <a:t>3/16/2020</a:t>
             </a:fld>
             <a:endParaRPr lang="en-US" dirty="0"/>
           </a:p>
@@ -2319,7 +2319,7 @@
           <a:p>
             <a:fld id="{4EDE50D6-574B-40AF-946F-D52A04ADE379}" type="datetime1">
               <a:rPr lang="en-US" smtClean="0"/>
-              <a:t>3/14/2020</a:t>
+              <a:t>3/16/2020</a:t>
             </a:fld>
             <a:endParaRPr lang="en-US" dirty="0"/>
           </a:p>
@@ -2696,7 +2696,7 @@
           <a:p>
             <a:fld id="{D82884F1-FFEA-405F-9602-3DCA865EDA4E}" type="datetime1">
               <a:rPr lang="en-US" smtClean="0"/>
-              <a:t>3/14/2020</a:t>
+              <a:t>3/16/2020</a:t>
             </a:fld>
             <a:endParaRPr lang="en-US" dirty="0"/>
           </a:p>
@@ -2989,7 +2989,7 @@
           <a:p>
             <a:fld id="{7E18DB4A-8810-4A10-AD5C-D5E2C667F5B3}" type="datetime1">
               <a:rPr lang="en-US" smtClean="0"/>
-              <a:t>3/14/2020</a:t>
+              <a:t>3/16/2020</a:t>
             </a:fld>
             <a:endParaRPr lang="en-US" dirty="0"/>
           </a:p>
@@ -3204,7 +3204,7 @@
           <a:p>
             <a:fld id="{ED291B17-9318-49DB-B28B-6E5994AE9581}" type="datetime1">
               <a:rPr lang="en-US" smtClean="0"/>
-              <a:t>3/14/2020</a:t>
+              <a:t>3/16/2020</a:t>
             </a:fld>
             <a:endParaRPr lang="en-US" dirty="0"/>
           </a:p>
@@ -3992,7 +3992,15 @@
             </a:r>
             <a:r>
               <a:rPr lang="en-US" dirty="0"/>
-              <a:t>, jack &amp; Sarai </a:t>
+              <a:t>, jack </a:t>
+            </a:r>
+            <a:r>
+              <a:rPr lang="en-US" dirty="0" err="1"/>
+              <a:t>Ozcelik</a:t>
+            </a:r>
+            <a:r>
+              <a:rPr lang="en-US" dirty="0"/>
+              <a:t> &amp; Sarai </a:t>
             </a:r>
             <a:r>
               <a:rPr lang="en-US" dirty="0" err="1"/>
@@ -4328,13 +4336,8 @@
           <a:p>
             <a:r>
               <a:rPr lang="en-US" dirty="0"/>
-              <a:t>Any </a:t>
-            </a:r>
-            <a:r>
-              <a:rPr lang="en-US"/>
-              <a:t>further questions</a:t>
-            </a:r>
-            <a:endParaRPr lang="en-US" dirty="0"/>
+              <a:t>Any further questions</a:t>
+            </a:r>
           </a:p>
           <a:p>
             <a:endParaRPr lang="en-US" dirty="0"/>

</xml_diff>